<commit_message>
As it usually occurs I've commited not everything
</commit_message>
<xml_diff>
--- a/Презентация/Боевая/Раздатка.pptx
+++ b/Презентация/Боевая/Раздатка.pptx
@@ -5860,41 +5860,7 @@
                 <a:ea typeface="+mj-ea"/>
                 <a:cs typeface="+mj-cs"/>
               </a:rPr>
-              <a:t> </a:t>
-            </a:r>
-            <a:r>
-              <a:rPr kumimoji="0" lang="ru-RU" sz="3200" b="0" i="0" u="none" strike="noStrike" kern="1200" cap="none" spc="0" normalizeH="0" noProof="0" dirty="0" smtClean="0">
-                <a:ln>
-                  <a:noFill/>
-                </a:ln>
-                <a:solidFill>
-                  <a:schemeClr val="tx1"/>
-                </a:solidFill>
-                <a:effectLst/>
-                <a:uLnTx/>
-                <a:uFillTx/>
-                <a:latin typeface="+mj-lt"/>
-                <a:ea typeface="+mj-ea"/>
-                <a:cs typeface="+mj-cs"/>
-              </a:rPr>
-              <a:t>подпрограмм процесса обмена </a:t>
-            </a:r>
-            <a:r>
-              <a:rPr kumimoji="0" lang="ru-RU" sz="3200" b="0" i="0" u="none" strike="noStrike" kern="1200" cap="none" spc="0" normalizeH="0" noProof="0" dirty="0" smtClean="0">
-                <a:ln>
-                  <a:noFill/>
-                </a:ln>
-                <a:solidFill>
-                  <a:schemeClr val="tx1"/>
-                </a:solidFill>
-                <a:effectLst/>
-                <a:uLnTx/>
-                <a:uFillTx/>
-                <a:latin typeface="+mj-lt"/>
-                <a:ea typeface="+mj-ea"/>
-                <a:cs typeface="+mj-cs"/>
-              </a:rPr>
-              <a:t>данными</a:t>
+              <a:t> подпрограмм процесса обмена данными</a:t>
             </a:r>
             <a:endParaRPr kumimoji="0" lang="ru-RU" sz="3200" b="0" i="0" u="none" strike="noStrike" kern="1200" cap="none" spc="0" normalizeH="0" baseline="0" noProof="0" dirty="0" smtClean="0">
               <a:ln>

</xml_diff>